<commit_message>
Add CI to slides.
</commit_message>
<xml_diff>
--- a/slides/Presentation.pptx
+++ b/slides/Presentation.pptx
@@ -6,10 +6,10 @@
     <p:sldMasterId id="2147484642" r:id="rId5"/>
   </p:sldMasterIdLst>
   <p:notesMasterIdLst>
-    <p:notesMasterId r:id="rId33"/>
+    <p:notesMasterId r:id="rId34"/>
   </p:notesMasterIdLst>
   <p:handoutMasterIdLst>
-    <p:handoutMasterId r:id="rId34"/>
+    <p:handoutMasterId r:id="rId35"/>
   </p:handoutMasterIdLst>
   <p:sldIdLst>
     <p:sldId id="1863" r:id="rId6"/>
@@ -26,19 +26,20 @@
     <p:sldId id="1875" r:id="rId17"/>
     <p:sldId id="1870" r:id="rId18"/>
     <p:sldId id="1894" r:id="rId19"/>
-    <p:sldId id="1883" r:id="rId20"/>
-    <p:sldId id="1896" r:id="rId21"/>
-    <p:sldId id="1897" r:id="rId22"/>
-    <p:sldId id="1884" r:id="rId23"/>
-    <p:sldId id="1885" r:id="rId24"/>
-    <p:sldId id="1888" r:id="rId25"/>
-    <p:sldId id="1887" r:id="rId26"/>
-    <p:sldId id="1890" r:id="rId27"/>
-    <p:sldId id="1891" r:id="rId28"/>
-    <p:sldId id="1892" r:id="rId29"/>
-    <p:sldId id="1886" r:id="rId30"/>
-    <p:sldId id="1895" r:id="rId31"/>
-    <p:sldId id="1889" r:id="rId32"/>
+    <p:sldId id="1898" r:id="rId20"/>
+    <p:sldId id="1883" r:id="rId21"/>
+    <p:sldId id="1896" r:id="rId22"/>
+    <p:sldId id="1897" r:id="rId23"/>
+    <p:sldId id="1884" r:id="rId24"/>
+    <p:sldId id="1885" r:id="rId25"/>
+    <p:sldId id="1888" r:id="rId26"/>
+    <p:sldId id="1887" r:id="rId27"/>
+    <p:sldId id="1890" r:id="rId28"/>
+    <p:sldId id="1891" r:id="rId29"/>
+    <p:sldId id="1892" r:id="rId30"/>
+    <p:sldId id="1886" r:id="rId31"/>
+    <p:sldId id="1895" r:id="rId32"/>
+    <p:sldId id="1889" r:id="rId33"/>
   </p:sldIdLst>
   <p:sldSz cx="12192000" cy="6858000"/>
   <p:notesSz cx="6858000" cy="9144000"/>
@@ -156,6 +157,7 @@
             <p14:sldId id="1875"/>
             <p14:sldId id="1870"/>
             <p14:sldId id="1894"/>
+            <p14:sldId id="1898"/>
             <p14:sldId id="1883"/>
             <p14:sldId id="1896"/>
             <p14:sldId id="1897"/>
@@ -5329,6 +5331,43 @@
         </a:p>
       </dgm:t>
     </dgm:pt>
+    <dgm:pt modelId="{BC6099B5-9958-441E-AE77-6FE4A95954A8}">
+      <dgm:prSet phldrT="[Text]"/>
+      <dgm:spPr/>
+      <dgm:t>
+        <a:bodyPr/>
+        <a:lstStyle/>
+        <a:p>
+          <a:r>
+            <a:rPr lang="en-US" dirty="0"/>
+            <a:t>CI</a:t>
+          </a:r>
+          <a:endParaRPr lang="cs-CZ" dirty="0"/>
+        </a:p>
+      </dgm:t>
+    </dgm:pt>
+    <dgm:pt modelId="{31F21175-575E-49E5-B8D0-10158345B566}" type="parTrans" cxnId="{C23AF57A-8E8A-4FA8-9AF7-225CD59EE1FF}">
+      <dgm:prSet/>
+      <dgm:spPr/>
+      <dgm:t>
+        <a:bodyPr/>
+        <a:lstStyle/>
+        <a:p>
+          <a:endParaRPr lang="cs-CZ"/>
+        </a:p>
+      </dgm:t>
+    </dgm:pt>
+    <dgm:pt modelId="{C34C50F9-2E54-4DCD-B3E2-B6CE2749A2F9}" type="sibTrans" cxnId="{C23AF57A-8E8A-4FA8-9AF7-225CD59EE1FF}">
+      <dgm:prSet/>
+      <dgm:spPr/>
+      <dgm:t>
+        <a:bodyPr/>
+        <a:lstStyle/>
+        <a:p>
+          <a:endParaRPr lang="cs-CZ"/>
+        </a:p>
+      </dgm:t>
+    </dgm:pt>
     <dgm:pt modelId="{A64AC0FE-65B3-4602-9243-68AD51DCD130}" type="pres">
       <dgm:prSet presAssocID="{65A5A95E-D695-4FDF-848A-49C1D9878C9B}" presName="diagram" presStyleCnt="0">
         <dgm:presLayoutVars>
@@ -5390,11 +5429,13 @@
     <dgm:cxn modelId="{B23ED11A-4318-4570-9F23-47E0E880027B}" type="presOf" srcId="{552DA122-5525-42B3-9D33-449D2A6137CD}" destId="{532157D9-EB74-49FD-A02A-80D1677A01FF}" srcOrd="0" destOrd="0" presId="urn:microsoft.com/office/officeart/2005/8/layout/default"/>
     <dgm:cxn modelId="{2CA47D1F-4C01-4A38-B1BC-DEDBB9D206F2}" srcId="{65A5A95E-D695-4FDF-848A-49C1D9878C9B}" destId="{913A1845-A224-4A2A-827D-15145A5C49E6}" srcOrd="3" destOrd="0" parTransId="{0CEF222C-3C7A-45CE-8803-7EB205DB2BE0}" sibTransId="{D7522448-8DE3-41C1-9532-E6A14599D3B4}"/>
     <dgm:cxn modelId="{46E43652-5DA1-4170-B2B9-CF33E493C915}" srcId="{65A5A95E-D695-4FDF-848A-49C1D9878C9B}" destId="{2D89434A-2235-41F0-B25F-F33DDDDAF2FD}" srcOrd="0" destOrd="0" parTransId="{951FC68C-0B12-45B3-A119-4050D233F60A}" sibTransId="{66556863-FFDA-4721-9263-56D236AFEDE6}"/>
+    <dgm:cxn modelId="{C23AF57A-8E8A-4FA8-9AF7-225CD59EE1FF}" srcId="{E487E2C0-DA74-4392-8CE9-E30CE4750C23}" destId="{BC6099B5-9958-441E-AE77-6FE4A95954A8}" srcOrd="2" destOrd="0" parTransId="{31F21175-575E-49E5-B8D0-10158345B566}" sibTransId="{C34C50F9-2E54-4DCD-B3E2-B6CE2749A2F9}"/>
     <dgm:cxn modelId="{50EBED7F-9D89-440A-8784-C9B2BCB034F2}" type="presOf" srcId="{8C3AF910-A5D4-4486-AE01-B8C152757D98}" destId="{10FDF0CE-E6CD-4C6B-9C20-736F4C074ADB}" srcOrd="0" destOrd="1" presId="urn:microsoft.com/office/officeart/2005/8/layout/default"/>
     <dgm:cxn modelId="{E5EC8F8B-1B4D-494D-A58A-553EF7F551C9}" type="presOf" srcId="{913A1845-A224-4A2A-827D-15145A5C49E6}" destId="{C2653387-FF80-43D2-9554-16947E2F1E24}" srcOrd="0" destOrd="0" presId="urn:microsoft.com/office/officeart/2005/8/layout/default"/>
     <dgm:cxn modelId="{45BA87C9-61F4-476E-A506-56D84D84ED7D}" srcId="{65A5A95E-D695-4FDF-848A-49C1D9878C9B}" destId="{E487E2C0-DA74-4392-8CE9-E30CE4750C23}" srcOrd="2" destOrd="0" parTransId="{AAA6DD63-ED93-4D74-9A94-EBE65356E9D3}" sibTransId="{683DE615-BFE4-4209-BEED-4A4DE06A9556}"/>
     <dgm:cxn modelId="{9858B6CE-193C-4009-B098-EB46732C7AED}" srcId="{E487E2C0-DA74-4392-8CE9-E30CE4750C23}" destId="{8C3AF910-A5D4-4486-AE01-B8C152757D98}" srcOrd="0" destOrd="0" parTransId="{53A4E2EC-2209-48D6-8D88-3CFDE824AC0B}" sibTransId="{0B5583F9-4E44-4A8C-8DFA-913541B701E7}"/>
     <dgm:cxn modelId="{D20BFFCF-BE20-40DD-9E4B-F755ED33B051}" type="presOf" srcId="{65A5A95E-D695-4FDF-848A-49C1D9878C9B}" destId="{A64AC0FE-65B3-4602-9243-68AD51DCD130}" srcOrd="0" destOrd="0" presId="urn:microsoft.com/office/officeart/2005/8/layout/default"/>
+    <dgm:cxn modelId="{6C4DEEFA-C0CC-4DF6-B139-17B5A67C66D5}" type="presOf" srcId="{BC6099B5-9958-441E-AE77-6FE4A95954A8}" destId="{10FDF0CE-E6CD-4C6B-9C20-736F4C074ADB}" srcOrd="0" destOrd="3" presId="urn:microsoft.com/office/officeart/2005/8/layout/default"/>
     <dgm:cxn modelId="{C6CA73FB-6B9C-46AE-8D2D-A81E96C3618C}" type="presOf" srcId="{2D89434A-2235-41F0-B25F-F33DDDDAF2FD}" destId="{85FA59D8-D1DD-4E69-84A0-6AAFC026F6D6}" srcOrd="0" destOrd="0" presId="urn:microsoft.com/office/officeart/2005/8/layout/default"/>
     <dgm:cxn modelId="{7B2105FE-5AB8-4DB0-A423-5E057B9C8204}" type="presOf" srcId="{E32B33C9-D9D7-4626-B9F4-F94A0D9FDC03}" destId="{10FDF0CE-E6CD-4C6B-9C20-736F4C074ADB}" srcOrd="0" destOrd="2" presId="urn:microsoft.com/office/officeart/2005/8/layout/default"/>
     <dgm:cxn modelId="{18B61DE8-528F-4C26-A93A-D321FDB8B3F3}" type="presParOf" srcId="{A64AC0FE-65B3-4602-9243-68AD51DCD130}" destId="{85FA59D8-D1DD-4E69-84A0-6AAFC026F6D6}" srcOrd="0" destOrd="0" presId="urn:microsoft.com/office/officeart/2005/8/layout/default"/>
@@ -7277,12 +7318,12 @@
         </a:fontRef>
       </dsp:style>
       <dsp:txBody>
-        <a:bodyPr spcFirstLastPara="0" vert="horz" wrap="square" lIns="110490" tIns="110490" rIns="110490" bIns="110490" numCol="1" spcCol="1270" anchor="ctr" anchorCtr="0">
+        <a:bodyPr spcFirstLastPara="0" vert="horz" wrap="square" lIns="95250" tIns="95250" rIns="95250" bIns="95250" numCol="1" spcCol="1270" anchor="ctr" anchorCtr="0">
           <a:noAutofit/>
         </a:bodyPr>
         <a:lstStyle/>
         <a:p>
-          <a:pPr marL="0" lvl="0" indent="0" algn="ctr" defTabSz="1289050">
+          <a:pPr marL="0" lvl="0" indent="0" algn="ctr" defTabSz="1111250">
             <a:lnSpc>
               <a:spcPct val="90000"/>
             </a:lnSpc>
@@ -7295,10 +7336,10 @@
             <a:buNone/>
           </a:pPr>
           <a:r>
-            <a:rPr lang="en-US" sz="2900" kern="1200" dirty="0"/>
+            <a:rPr lang="en-US" sz="2500" kern="1200" dirty="0"/>
             <a:t>Json</a:t>
           </a:r>
-          <a:endParaRPr lang="cs-CZ" sz="2900" kern="1200" dirty="0"/>
+          <a:endParaRPr lang="cs-CZ" sz="2500" kern="1200" dirty="0"/>
         </a:p>
       </dsp:txBody>
       <dsp:txXfrm>
@@ -7355,12 +7396,12 @@
         </a:fontRef>
       </dsp:style>
       <dsp:txBody>
-        <a:bodyPr spcFirstLastPara="0" vert="horz" wrap="square" lIns="110490" tIns="110490" rIns="110490" bIns="110490" numCol="1" spcCol="1270" anchor="ctr" anchorCtr="0">
+        <a:bodyPr spcFirstLastPara="0" vert="horz" wrap="square" lIns="95250" tIns="95250" rIns="95250" bIns="95250" numCol="1" spcCol="1270" anchor="ctr" anchorCtr="0">
           <a:noAutofit/>
         </a:bodyPr>
         <a:lstStyle/>
         <a:p>
-          <a:pPr marL="0" lvl="0" indent="0" algn="ctr" defTabSz="1289050">
+          <a:pPr marL="0" lvl="0" indent="0" algn="ctr" defTabSz="1111250">
             <a:lnSpc>
               <a:spcPct val="90000"/>
             </a:lnSpc>
@@ -7373,10 +7414,10 @@
             <a:buNone/>
           </a:pPr>
           <a:r>
-            <a:rPr lang="en-US" sz="2900" kern="1200" dirty="0"/>
+            <a:rPr lang="en-US" sz="2500" kern="1200" dirty="0"/>
             <a:t>User Secrets</a:t>
           </a:r>
-          <a:endParaRPr lang="cs-CZ" sz="2900" kern="1200" dirty="0"/>
+          <a:endParaRPr lang="cs-CZ" sz="2500" kern="1200" dirty="0"/>
         </a:p>
       </dsp:txBody>
       <dsp:txXfrm>
@@ -7433,12 +7474,12 @@
         </a:fontRef>
       </dsp:style>
       <dsp:txBody>
-        <a:bodyPr spcFirstLastPara="0" vert="horz" wrap="square" lIns="110490" tIns="110490" rIns="110490" bIns="110490" numCol="1" spcCol="1270" anchor="t" anchorCtr="0">
+        <a:bodyPr spcFirstLastPara="0" vert="horz" wrap="square" lIns="95250" tIns="95250" rIns="95250" bIns="95250" numCol="1" spcCol="1270" anchor="t" anchorCtr="0">
           <a:noAutofit/>
         </a:bodyPr>
         <a:lstStyle/>
         <a:p>
-          <a:pPr marL="0" lvl="0" indent="0" algn="l" defTabSz="1289050">
+          <a:pPr marL="0" lvl="0" indent="0" algn="l" defTabSz="1111250">
             <a:lnSpc>
               <a:spcPct val="90000"/>
             </a:lnSpc>
@@ -7451,13 +7492,13 @@
             <a:buNone/>
           </a:pPr>
           <a:r>
-            <a:rPr lang="en-US" sz="2900" kern="1200" dirty="0"/>
+            <a:rPr lang="en-US" sz="2500" kern="1200" dirty="0"/>
             <a:t>Environment variables</a:t>
           </a:r>
-          <a:endParaRPr lang="cs-CZ" sz="2900" kern="1200" dirty="0"/>
+          <a:endParaRPr lang="cs-CZ" sz="2500" kern="1200" dirty="0"/>
         </a:p>
         <a:p>
-          <a:pPr marL="228600" lvl="1" indent="-228600" algn="l" defTabSz="1022350">
+          <a:pPr marL="228600" lvl="1" indent="-228600" algn="l" defTabSz="889000">
             <a:lnSpc>
               <a:spcPct val="90000"/>
             </a:lnSpc>
@@ -7470,13 +7511,13 @@
             <a:buChar char="•"/>
           </a:pPr>
           <a:r>
-            <a:rPr lang="en-US" sz="2300" kern="1200" dirty="0"/>
+            <a:rPr lang="en-US" sz="2000" kern="1200" dirty="0"/>
             <a:t>App Service</a:t>
           </a:r>
-          <a:endParaRPr lang="cs-CZ" sz="2300" kern="1200" dirty="0"/>
+          <a:endParaRPr lang="cs-CZ" sz="2000" kern="1200" dirty="0"/>
         </a:p>
         <a:p>
-          <a:pPr marL="228600" lvl="1" indent="-228600" algn="l" defTabSz="1022350">
+          <a:pPr marL="228600" lvl="1" indent="-228600" algn="l" defTabSz="889000">
             <a:lnSpc>
               <a:spcPct val="90000"/>
             </a:lnSpc>
@@ -7489,10 +7530,29 @@
             <a:buChar char="•"/>
           </a:pPr>
           <a:r>
-            <a:rPr lang="en-US" sz="2300" kern="1200" dirty="0"/>
+            <a:rPr lang="en-US" sz="2000" kern="1200" dirty="0"/>
             <a:t>Docker</a:t>
           </a:r>
-          <a:endParaRPr lang="cs-CZ" sz="2300" kern="1200" dirty="0"/>
+          <a:endParaRPr lang="cs-CZ" sz="2000" kern="1200" dirty="0"/>
+        </a:p>
+        <a:p>
+          <a:pPr marL="228600" lvl="1" indent="-228600" algn="l" defTabSz="889000">
+            <a:lnSpc>
+              <a:spcPct val="90000"/>
+            </a:lnSpc>
+            <a:spcBef>
+              <a:spcPct val="0"/>
+            </a:spcBef>
+            <a:spcAft>
+              <a:spcPct val="15000"/>
+            </a:spcAft>
+            <a:buChar char="•"/>
+          </a:pPr>
+          <a:r>
+            <a:rPr lang="en-US" sz="2000" kern="1200" dirty="0"/>
+            <a:t>CI</a:t>
+          </a:r>
+          <a:endParaRPr lang="cs-CZ" sz="2000" kern="1200" dirty="0"/>
         </a:p>
       </dsp:txBody>
       <dsp:txXfrm>
@@ -7543,12 +7603,12 @@
         </a:fontRef>
       </dsp:style>
       <dsp:txBody>
-        <a:bodyPr spcFirstLastPara="0" vert="horz" wrap="square" lIns="110490" tIns="110490" rIns="110490" bIns="110490" numCol="1" spcCol="1270" anchor="ctr" anchorCtr="0">
+        <a:bodyPr spcFirstLastPara="0" vert="horz" wrap="square" lIns="95250" tIns="95250" rIns="95250" bIns="95250" numCol="1" spcCol="1270" anchor="ctr" anchorCtr="0">
           <a:noAutofit/>
         </a:bodyPr>
         <a:lstStyle/>
         <a:p>
-          <a:pPr marL="0" lvl="0" indent="0" algn="ctr" defTabSz="1289050">
+          <a:pPr marL="0" lvl="0" indent="0" algn="ctr" defTabSz="1111250">
             <a:lnSpc>
               <a:spcPct val="90000"/>
             </a:lnSpc>
@@ -7561,10 +7621,10 @@
             <a:buNone/>
           </a:pPr>
           <a:r>
-            <a:rPr lang="en-US" sz="2900" kern="1200" dirty="0"/>
+            <a:rPr lang="en-US" sz="2500" kern="1200" dirty="0"/>
             <a:t>Command line arguments</a:t>
           </a:r>
-          <a:endParaRPr lang="cs-CZ" sz="2900" kern="1200" dirty="0"/>
+          <a:endParaRPr lang="cs-CZ" sz="2500" kern="1200" dirty="0"/>
         </a:p>
       </dsp:txBody>
       <dsp:txXfrm>
@@ -20647,7 +20707,7 @@
             <a:fld id="{B4008EB6-D09E-4580-8CD6-DDB14511944F}" type="slidenum">
               <a:rPr lang="en-US" smtClean="0"/>
               <a:pPr/>
-              <a:t>18</a:t>
+              <a:t>19</a:t>
             </a:fld>
             <a:endParaRPr lang="en-US" dirty="0"/>
           </a:p>
@@ -20861,7 +20921,7 @@
             <a:fld id="{B4008EB6-D09E-4580-8CD6-DDB14511944F}" type="slidenum">
               <a:rPr lang="en-US" smtClean="0"/>
               <a:pPr/>
-              <a:t>19</a:t>
+              <a:t>20</a:t>
             </a:fld>
             <a:endParaRPr lang="en-US" dirty="0"/>
           </a:p>
@@ -21026,7 +21086,7 @@
             <a:fld id="{B4008EB6-D09E-4580-8CD6-DDB14511944F}" type="slidenum">
               <a:rPr lang="en-US" smtClean="0"/>
               <a:pPr/>
-              <a:t>25</a:t>
+              <a:t>26</a:t>
             </a:fld>
             <a:endParaRPr lang="en-US" dirty="0"/>
           </a:p>
@@ -40218,6 +40278,245 @@
           <p:cNvPr id="2" name="Nadpis 1">
             <a:extLst>
               <a:ext uri="{FF2B5EF4-FFF2-40B4-BE49-F238E27FC236}">
+                <a16:creationId xmlns:a16="http://schemas.microsoft.com/office/drawing/2014/main" id="{7A4C4FE0-C8A2-448C-835A-6C4DCB958167}"/>
+              </a:ext>
+            </a:extLst>
+          </p:cNvPr>
+          <p:cNvSpPr>
+            <a:spLocks noGrp="1"/>
+          </p:cNvSpPr>
+          <p:nvPr>
+            <p:ph type="title"/>
+          </p:nvPr>
+        </p:nvSpPr>
+        <p:spPr/>
+        <p:txBody>
+          <a:bodyPr/>
+          <a:lstStyle/>
+          <a:p>
+            <a:r>
+              <a:rPr lang="cs-CZ" dirty="0"/>
+              <a:t>Testování</a:t>
+            </a:r>
+            <a:r>
+              <a:rPr lang="en-US" dirty="0"/>
+              <a:t> v CI</a:t>
+            </a:r>
+            <a:endParaRPr lang="cs-CZ" dirty="0"/>
+          </a:p>
+        </p:txBody>
+      </p:sp>
+      <p:pic>
+        <p:nvPicPr>
+          <p:cNvPr id="3" name="Obrázek 2">
+            <a:extLst>
+              <a:ext uri="{FF2B5EF4-FFF2-40B4-BE49-F238E27FC236}">
+                <a16:creationId xmlns:a16="http://schemas.microsoft.com/office/drawing/2014/main" id="{C5103019-568A-4869-8B42-2574ADE4079E}"/>
+              </a:ext>
+            </a:extLst>
+          </p:cNvPr>
+          <p:cNvPicPr>
+            <a:picLocks noChangeAspect="1"/>
+          </p:cNvPicPr>
+          <p:nvPr/>
+        </p:nvPicPr>
+        <p:blipFill>
+          <a:blip r:embed="rId2"/>
+          <a:stretch>
+            <a:fillRect/>
+          </a:stretch>
+        </p:blipFill>
+        <p:spPr>
+          <a:xfrm>
+            <a:off x="588263" y="1296513"/>
+            <a:ext cx="3839111" cy="2657846"/>
+          </a:xfrm>
+          <a:prstGeom prst="rect">
+            <a:avLst/>
+          </a:prstGeom>
+        </p:spPr>
+      </p:pic>
+      <p:pic>
+        <p:nvPicPr>
+          <p:cNvPr id="4" name="Obrázek 3">
+            <a:extLst>
+              <a:ext uri="{FF2B5EF4-FFF2-40B4-BE49-F238E27FC236}">
+                <a16:creationId xmlns:a16="http://schemas.microsoft.com/office/drawing/2014/main" id="{C9B13518-EA76-45EA-BD67-81AB5D802B73}"/>
+              </a:ext>
+            </a:extLst>
+          </p:cNvPr>
+          <p:cNvPicPr>
+            <a:picLocks noChangeAspect="1"/>
+          </p:cNvPicPr>
+          <p:nvPr/>
+        </p:nvPicPr>
+        <p:blipFill>
+          <a:blip r:embed="rId3"/>
+          <a:stretch>
+            <a:fillRect/>
+          </a:stretch>
+        </p:blipFill>
+        <p:spPr>
+          <a:xfrm>
+            <a:off x="4747781" y="1011198"/>
+            <a:ext cx="6182588" cy="5544324"/>
+          </a:xfrm>
+          <a:prstGeom prst="rect">
+            <a:avLst/>
+          </a:prstGeom>
+        </p:spPr>
+      </p:pic>
+      <p:pic>
+        <p:nvPicPr>
+          <p:cNvPr id="6" name="Obrázek 5">
+            <a:extLst>
+              <a:ext uri="{FF2B5EF4-FFF2-40B4-BE49-F238E27FC236}">
+                <a16:creationId xmlns:a16="http://schemas.microsoft.com/office/drawing/2014/main" id="{65518804-9924-42B9-BE85-7201F2B0E92C}"/>
+              </a:ext>
+            </a:extLst>
+          </p:cNvPr>
+          <p:cNvPicPr>
+            <a:picLocks noChangeAspect="1"/>
+          </p:cNvPicPr>
+          <p:nvPr/>
+        </p:nvPicPr>
+        <p:blipFill>
+          <a:blip r:embed="rId4"/>
+          <a:stretch>
+            <a:fillRect/>
+          </a:stretch>
+        </p:blipFill>
+        <p:spPr>
+          <a:xfrm>
+            <a:off x="588263" y="4184459"/>
+            <a:ext cx="2810267" cy="2524477"/>
+          </a:xfrm>
+          <a:prstGeom prst="rect">
+            <a:avLst/>
+          </a:prstGeom>
+        </p:spPr>
+      </p:pic>
+    </p:spTree>
+    <p:extLst>
+      <p:ext uri="{BB962C8B-B14F-4D97-AF65-F5344CB8AC3E}">
+        <p14:creationId xmlns:p14="http://schemas.microsoft.com/office/powerpoint/2010/main" val="586621480"/>
+      </p:ext>
+    </p:extLst>
+  </p:cSld>
+  <p:clrMapOvr>
+    <a:masterClrMapping/>
+  </p:clrMapOvr>
+  <p:transition>
+    <p:fade/>
+  </p:transition>
+  <p:timing>
+    <p:tnLst>
+      <p:par>
+        <p:cTn id="1" dur="indefinite" restart="never" nodeType="tmRoot">
+          <p:childTnLst>
+            <p:seq concurrent="1" nextAc="seek">
+              <p:cTn id="2" dur="indefinite" nodeType="mainSeq">
+                <p:childTnLst>
+                  <p:par>
+                    <p:cTn id="3" fill="hold">
+                      <p:stCondLst>
+                        <p:cond delay="indefinite"/>
+                      </p:stCondLst>
+                      <p:childTnLst>
+                        <p:par>
+                          <p:cTn id="4" fill="hold">
+                            <p:stCondLst>
+                              <p:cond delay="0"/>
+                            </p:stCondLst>
+                            <p:childTnLst>
+                              <p:par>
+                                <p:cTn id="5" presetID="10" presetClass="entr" presetSubtype="0" fill="hold" nodeType="clickEffect">
+                                  <p:stCondLst>
+                                    <p:cond delay="0"/>
+                                  </p:stCondLst>
+                                  <p:childTnLst>
+                                    <p:set>
+                                      <p:cBhvr>
+                                        <p:cTn id="6" dur="1" fill="hold">
+                                          <p:stCondLst>
+                                            <p:cond delay="0"/>
+                                          </p:stCondLst>
+                                        </p:cTn>
+                                        <p:tgtEl>
+                                          <p:spTgt spid="6"/>
+                                        </p:tgtEl>
+                                        <p:attrNameLst>
+                                          <p:attrName>style.visibility</p:attrName>
+                                        </p:attrNameLst>
+                                      </p:cBhvr>
+                                      <p:to>
+                                        <p:strVal val="visible"/>
+                                      </p:to>
+                                    </p:set>
+                                    <p:animEffect transition="in" filter="fade">
+                                      <p:cBhvr>
+                                        <p:cTn id="7" dur="500"/>
+                                        <p:tgtEl>
+                                          <p:spTgt spid="6"/>
+                                        </p:tgtEl>
+                                      </p:cBhvr>
+                                    </p:animEffect>
+                                  </p:childTnLst>
+                                </p:cTn>
+                              </p:par>
+                            </p:childTnLst>
+                          </p:cTn>
+                        </p:par>
+                      </p:childTnLst>
+                    </p:cTn>
+                  </p:par>
+                </p:childTnLst>
+              </p:cTn>
+              <p:prevCondLst>
+                <p:cond evt="onPrev" delay="0">
+                  <p:tgtEl>
+                    <p:sldTgt/>
+                  </p:tgtEl>
+                </p:cond>
+              </p:prevCondLst>
+              <p:nextCondLst>
+                <p:cond evt="onNext" delay="0">
+                  <p:tgtEl>
+                    <p:sldTgt/>
+                  </p:tgtEl>
+                </p:cond>
+              </p:nextCondLst>
+            </p:seq>
+          </p:childTnLst>
+        </p:cTn>
+      </p:par>
+    </p:tnLst>
+  </p:timing>
+</p:sld>
+</file>
+
+<file path=ppt/slides/slide16.xml><?xml version="1.0" encoding="utf-8"?>
+<p:sld xmlns:a="http://schemas.openxmlformats.org/drawingml/2006/main" xmlns:r="http://schemas.openxmlformats.org/officeDocument/2006/relationships" xmlns:p="http://schemas.openxmlformats.org/presentationml/2006/main">
+  <p:cSld>
+    <p:spTree>
+      <p:nvGrpSpPr>
+        <p:cNvPr id="1" name=""/>
+        <p:cNvGrpSpPr/>
+        <p:nvPr/>
+      </p:nvGrpSpPr>
+      <p:grpSpPr>
+        <a:xfrm>
+          <a:off x="0" y="0"/>
+          <a:ext cx="0" cy="0"/>
+          <a:chOff x="0" y="0"/>
+          <a:chExt cx="0" cy="0"/>
+        </a:xfrm>
+      </p:grpSpPr>
+      <p:sp>
+        <p:nvSpPr>
+          <p:cNvPr id="2" name="Nadpis 1">
+            <a:extLst>
+              <a:ext uri="{FF2B5EF4-FFF2-40B4-BE49-F238E27FC236}">
                 <a16:creationId xmlns:a16="http://schemas.microsoft.com/office/drawing/2014/main" id="{26EFC7F4-4129-482B-BEB2-BE39FE125D17}"/>
               </a:ext>
             </a:extLst>
@@ -40337,7 +40636,7 @@
 </p:sld>
 </file>
 
-<file path=ppt/slides/slide16.xml><?xml version="1.0" encoding="utf-8"?>
+<file path=ppt/slides/slide17.xml><?xml version="1.0" encoding="utf-8"?>
 <p:sld xmlns:a="http://schemas.openxmlformats.org/drawingml/2006/main" xmlns:r="http://schemas.openxmlformats.org/officeDocument/2006/relationships" xmlns:p="http://schemas.openxmlformats.org/presentationml/2006/main">
   <p:cSld>
     <p:spTree>
@@ -40427,7 +40726,7 @@
 </p:sld>
 </file>
 
-<file path=ppt/slides/slide17.xml><?xml version="1.0" encoding="utf-8"?>
+<file path=ppt/slides/slide18.xml><?xml version="1.0" encoding="utf-8"?>
 <p:sld xmlns:a="http://schemas.openxmlformats.org/drawingml/2006/main" xmlns:r="http://schemas.openxmlformats.org/officeDocument/2006/relationships" xmlns:p="http://schemas.openxmlformats.org/presentationml/2006/main">
   <p:cSld>
     <p:spTree>
@@ -40517,7 +40816,7 @@
 </p:sld>
 </file>
 
-<file path=ppt/slides/slide18.xml><?xml version="1.0" encoding="utf-8"?>
+<file path=ppt/slides/slide19.xml><?xml version="1.0" encoding="utf-8"?>
 <p:sld xmlns:a="http://schemas.openxmlformats.org/drawingml/2006/main" xmlns:r="http://schemas.openxmlformats.org/officeDocument/2006/relationships" xmlns:p="http://schemas.openxmlformats.org/presentationml/2006/main">
   <p:cSld>
     <p:spTree>
@@ -40913,7 +41212,231 @@
 </p:sld>
 </file>
 
-<file path=ppt/slides/slide19.xml><?xml version="1.0" encoding="utf-8"?>
+<file path=ppt/slides/slide2.xml><?xml version="1.0" encoding="utf-8"?>
+<p:sld xmlns:a="http://schemas.openxmlformats.org/drawingml/2006/main" xmlns:r="http://schemas.openxmlformats.org/officeDocument/2006/relationships" xmlns:p="http://schemas.openxmlformats.org/presentationml/2006/main">
+  <p:cSld>
+    <p:spTree>
+      <p:nvGrpSpPr>
+        <p:cNvPr id="1" name=""/>
+        <p:cNvGrpSpPr/>
+        <p:nvPr/>
+      </p:nvGrpSpPr>
+      <p:grpSpPr>
+        <a:xfrm>
+          <a:off x="0" y="0"/>
+          <a:ext cx="0" cy="0"/>
+          <a:chOff x="0" y="0"/>
+          <a:chExt cx="0" cy="0"/>
+        </a:xfrm>
+      </p:grpSpPr>
+      <p:sp>
+        <p:nvSpPr>
+          <p:cNvPr id="2" name="Nadpis 1">
+            <a:extLst>
+              <a:ext uri="{FF2B5EF4-FFF2-40B4-BE49-F238E27FC236}">
+                <a16:creationId xmlns:a16="http://schemas.microsoft.com/office/drawing/2014/main" id="{7027155A-3206-463A-9E13-B24A9C0B9FD3}"/>
+              </a:ext>
+            </a:extLst>
+          </p:cNvPr>
+          <p:cNvSpPr>
+            <a:spLocks noGrp="1"/>
+          </p:cNvSpPr>
+          <p:nvPr>
+            <p:ph type="title"/>
+          </p:nvPr>
+        </p:nvSpPr>
+        <p:spPr/>
+        <p:txBody>
+          <a:bodyPr/>
+          <a:lstStyle/>
+          <a:p>
+            <a:r>
+              <a:rPr lang="en-US" dirty="0"/>
+              <a:t>Kdo jsem</a:t>
+            </a:r>
+            <a:endParaRPr lang="cs-CZ" dirty="0"/>
+          </a:p>
+        </p:txBody>
+      </p:sp>
+      <p:sp>
+        <p:nvSpPr>
+          <p:cNvPr id="3" name="Zástupný text 2">
+            <a:extLst>
+              <a:ext uri="{FF2B5EF4-FFF2-40B4-BE49-F238E27FC236}">
+                <a16:creationId xmlns:a16="http://schemas.microsoft.com/office/drawing/2014/main" id="{87B1D569-7546-4D4F-A764-575AA905653A}"/>
+              </a:ext>
+            </a:extLst>
+          </p:cNvPr>
+          <p:cNvSpPr>
+            <a:spLocks noGrp="1"/>
+          </p:cNvSpPr>
+          <p:nvPr>
+            <p:ph type="body" sz="quarter" idx="10"/>
+          </p:nvPr>
+        </p:nvSpPr>
+        <p:spPr>
+          <a:xfrm>
+            <a:off x="584200" y="1435497"/>
+            <a:ext cx="11018520" cy="3533275"/>
+          </a:xfrm>
+        </p:spPr>
+        <p:txBody>
+          <a:bodyPr/>
+          <a:lstStyle/>
+          <a:p>
+            <a:r>
+              <a:rPr lang="en-US" dirty="0"/>
+              <a:t>Microsoft Learn Student Ambassador</a:t>
+            </a:r>
+          </a:p>
+          <a:p>
+            <a:r>
+              <a:rPr lang="cs-CZ" dirty="0"/>
+              <a:t>Student FEL ČVUT</a:t>
+            </a:r>
+          </a:p>
+          <a:p>
+            <a:r>
+              <a:rPr lang="cs-CZ" dirty="0"/>
+              <a:t>Integrační architekt v</a:t>
+            </a:r>
+            <a:r>
+              <a:rPr lang="en-US" dirty="0"/>
+              <a:t>e </a:t>
+            </a:r>
+            <a:r>
+              <a:rPr lang="cs-CZ" dirty="0"/>
+              <a:t>firmě</a:t>
+            </a:r>
+            <a:r>
+              <a:rPr lang="en-US" dirty="0"/>
+              <a:t> Networg</a:t>
+            </a:r>
+          </a:p>
+          <a:p>
+            <a:r>
+              <a:rPr lang="cs-CZ" dirty="0"/>
+              <a:t>Vývojář, pisatel článků a příležitostný školitel</a:t>
+            </a:r>
+          </a:p>
+          <a:p>
+            <a:r>
+              <a:rPr lang="en-US" dirty="0"/>
+              <a:t>C#, Haskell, Python, C++, …</a:t>
+            </a:r>
+          </a:p>
+          <a:p>
+            <a:r>
+              <a:rPr lang="en-US" dirty="0"/>
+              <a:t>github.com/</a:t>
+            </a:r>
+            <a:r>
+              <a:rPr lang="en-US" dirty="0" err="1"/>
+              <a:t>skalahonza</a:t>
+            </a:r>
+            <a:r>
+              <a:rPr lang="en-US" dirty="0"/>
+              <a:t> </a:t>
+            </a:r>
+          </a:p>
+          <a:p>
+            <a:r>
+              <a:rPr lang="en-US" dirty="0"/>
+              <a:t>janskala.cz </a:t>
+            </a:r>
+            <a:endParaRPr lang="cs-CZ" dirty="0"/>
+          </a:p>
+        </p:txBody>
+      </p:sp>
+      <p:pic>
+        <p:nvPicPr>
+          <p:cNvPr id="5" name="Grafický objekt 4" descr="Internet">
+            <a:extLst>
+              <a:ext uri="{FF2B5EF4-FFF2-40B4-BE49-F238E27FC236}">
+                <a16:creationId xmlns:a16="http://schemas.microsoft.com/office/drawing/2014/main" id="{6EB4A95A-BD17-4E96-8CCA-C1A059623120}"/>
+              </a:ext>
+            </a:extLst>
+          </p:cNvPr>
+          <p:cNvPicPr>
+            <a:picLocks noChangeAspect="1"/>
+          </p:cNvPicPr>
+          <p:nvPr/>
+        </p:nvPicPr>
+        <p:blipFill>
+          <a:blip r:embed="rId3">
+            <a:extLst>
+              <a:ext uri="{96DAC541-7B7A-43D3-8B79-37D633B846F1}">
+                <asvg:svgBlip xmlns:asvg="http://schemas.microsoft.com/office/drawing/2016/SVG/main" r:embed="rId4"/>
+              </a:ext>
+            </a:extLst>
+          </a:blip>
+          <a:stretch>
+            <a:fillRect/>
+          </a:stretch>
+        </p:blipFill>
+        <p:spPr>
+          <a:xfrm>
+            <a:off x="2486025" y="4352925"/>
+            <a:ext cx="914400" cy="914400"/>
+          </a:xfrm>
+          <a:prstGeom prst="rect">
+            <a:avLst/>
+          </a:prstGeom>
+        </p:spPr>
+      </p:pic>
+      <p:pic>
+        <p:nvPicPr>
+          <p:cNvPr id="10" name="Obrázek 9">
+            <a:extLst>
+              <a:ext uri="{FF2B5EF4-FFF2-40B4-BE49-F238E27FC236}">
+                <a16:creationId xmlns:a16="http://schemas.microsoft.com/office/drawing/2014/main" id="{C9067023-1D5F-4B67-BAD8-15D36773FB27}"/>
+              </a:ext>
+            </a:extLst>
+          </p:cNvPr>
+          <p:cNvPicPr>
+            <a:picLocks noChangeAspect="1"/>
+          </p:cNvPicPr>
+          <p:nvPr/>
+        </p:nvPicPr>
+        <p:blipFill>
+          <a:blip r:embed="rId5">
+            <a:extLst>
+              <a:ext uri="{837473B0-CC2E-450A-ABE3-18F120FF3D39}">
+                <a1611:picAttrSrcUrl xmlns:a1611="http://schemas.microsoft.com/office/drawing/2016/11/main" r:id="rId6"/>
+              </a:ext>
+            </a:extLst>
+          </a:blip>
+          <a:stretch>
+            <a:fillRect/>
+          </a:stretch>
+        </p:blipFill>
+        <p:spPr>
+          <a:xfrm>
+            <a:off x="4402100" y="3767824"/>
+            <a:ext cx="900150" cy="900150"/>
+          </a:xfrm>
+          <a:prstGeom prst="rect">
+            <a:avLst/>
+          </a:prstGeom>
+        </p:spPr>
+      </p:pic>
+    </p:spTree>
+    <p:extLst>
+      <p:ext uri="{BB962C8B-B14F-4D97-AF65-F5344CB8AC3E}">
+        <p14:creationId xmlns:p14="http://schemas.microsoft.com/office/powerpoint/2010/main" val="189779514"/>
+      </p:ext>
+    </p:extLst>
+  </p:cSld>
+  <p:clrMapOvr>
+    <a:masterClrMapping/>
+  </p:clrMapOvr>
+  <p:transition>
+    <p:fade/>
+  </p:transition>
+</p:sld>
+</file>
+
+<file path=ppt/slides/slide20.xml><?xml version="1.0" encoding="utf-8"?>
 <p:sld xmlns:a="http://schemas.openxmlformats.org/drawingml/2006/main" xmlns:r="http://schemas.openxmlformats.org/officeDocument/2006/relationships" xmlns:p="http://schemas.openxmlformats.org/presentationml/2006/main">
   <p:cSld>
     <p:spTree>
@@ -41310,231 +41833,7 @@
 </p:sld>
 </file>
 
-<file path=ppt/slides/slide2.xml><?xml version="1.0" encoding="utf-8"?>
-<p:sld xmlns:a="http://schemas.openxmlformats.org/drawingml/2006/main" xmlns:r="http://schemas.openxmlformats.org/officeDocument/2006/relationships" xmlns:p="http://schemas.openxmlformats.org/presentationml/2006/main">
-  <p:cSld>
-    <p:spTree>
-      <p:nvGrpSpPr>
-        <p:cNvPr id="1" name=""/>
-        <p:cNvGrpSpPr/>
-        <p:nvPr/>
-      </p:nvGrpSpPr>
-      <p:grpSpPr>
-        <a:xfrm>
-          <a:off x="0" y="0"/>
-          <a:ext cx="0" cy="0"/>
-          <a:chOff x="0" y="0"/>
-          <a:chExt cx="0" cy="0"/>
-        </a:xfrm>
-      </p:grpSpPr>
-      <p:sp>
-        <p:nvSpPr>
-          <p:cNvPr id="2" name="Nadpis 1">
-            <a:extLst>
-              <a:ext uri="{FF2B5EF4-FFF2-40B4-BE49-F238E27FC236}">
-                <a16:creationId xmlns:a16="http://schemas.microsoft.com/office/drawing/2014/main" id="{7027155A-3206-463A-9E13-B24A9C0B9FD3}"/>
-              </a:ext>
-            </a:extLst>
-          </p:cNvPr>
-          <p:cNvSpPr>
-            <a:spLocks noGrp="1"/>
-          </p:cNvSpPr>
-          <p:nvPr>
-            <p:ph type="title"/>
-          </p:nvPr>
-        </p:nvSpPr>
-        <p:spPr/>
-        <p:txBody>
-          <a:bodyPr/>
-          <a:lstStyle/>
-          <a:p>
-            <a:r>
-              <a:rPr lang="en-US" dirty="0"/>
-              <a:t>Kdo jsem</a:t>
-            </a:r>
-            <a:endParaRPr lang="cs-CZ" dirty="0"/>
-          </a:p>
-        </p:txBody>
-      </p:sp>
-      <p:sp>
-        <p:nvSpPr>
-          <p:cNvPr id="3" name="Zástupný text 2">
-            <a:extLst>
-              <a:ext uri="{FF2B5EF4-FFF2-40B4-BE49-F238E27FC236}">
-                <a16:creationId xmlns:a16="http://schemas.microsoft.com/office/drawing/2014/main" id="{87B1D569-7546-4D4F-A764-575AA905653A}"/>
-              </a:ext>
-            </a:extLst>
-          </p:cNvPr>
-          <p:cNvSpPr>
-            <a:spLocks noGrp="1"/>
-          </p:cNvSpPr>
-          <p:nvPr>
-            <p:ph type="body" sz="quarter" idx="10"/>
-          </p:nvPr>
-        </p:nvSpPr>
-        <p:spPr>
-          <a:xfrm>
-            <a:off x="584200" y="1435497"/>
-            <a:ext cx="11018520" cy="3533275"/>
-          </a:xfrm>
-        </p:spPr>
-        <p:txBody>
-          <a:bodyPr/>
-          <a:lstStyle/>
-          <a:p>
-            <a:r>
-              <a:rPr lang="en-US" dirty="0"/>
-              <a:t>Microsoft Learn Student Ambassador</a:t>
-            </a:r>
-          </a:p>
-          <a:p>
-            <a:r>
-              <a:rPr lang="cs-CZ" dirty="0"/>
-              <a:t>Student FEL ČVUT</a:t>
-            </a:r>
-          </a:p>
-          <a:p>
-            <a:r>
-              <a:rPr lang="cs-CZ" dirty="0"/>
-              <a:t>Integrační architekt v</a:t>
-            </a:r>
-            <a:r>
-              <a:rPr lang="en-US" dirty="0"/>
-              <a:t>e </a:t>
-            </a:r>
-            <a:r>
-              <a:rPr lang="cs-CZ" dirty="0"/>
-              <a:t>firmě</a:t>
-            </a:r>
-            <a:r>
-              <a:rPr lang="en-US" dirty="0"/>
-              <a:t> Networg</a:t>
-            </a:r>
-          </a:p>
-          <a:p>
-            <a:r>
-              <a:rPr lang="cs-CZ" dirty="0"/>
-              <a:t>Vývojář, pisatel článků a příležitostný školitel</a:t>
-            </a:r>
-          </a:p>
-          <a:p>
-            <a:r>
-              <a:rPr lang="en-US" dirty="0"/>
-              <a:t>C#, Haskell, Python, C++, …</a:t>
-            </a:r>
-          </a:p>
-          <a:p>
-            <a:r>
-              <a:rPr lang="en-US" dirty="0"/>
-              <a:t>github.com/</a:t>
-            </a:r>
-            <a:r>
-              <a:rPr lang="en-US" dirty="0" err="1"/>
-              <a:t>skalahonza</a:t>
-            </a:r>
-            <a:r>
-              <a:rPr lang="en-US" dirty="0"/>
-              <a:t> </a:t>
-            </a:r>
-          </a:p>
-          <a:p>
-            <a:r>
-              <a:rPr lang="en-US" dirty="0"/>
-              <a:t>janskala.cz </a:t>
-            </a:r>
-            <a:endParaRPr lang="cs-CZ" dirty="0"/>
-          </a:p>
-        </p:txBody>
-      </p:sp>
-      <p:pic>
-        <p:nvPicPr>
-          <p:cNvPr id="5" name="Grafický objekt 4" descr="Internet">
-            <a:extLst>
-              <a:ext uri="{FF2B5EF4-FFF2-40B4-BE49-F238E27FC236}">
-                <a16:creationId xmlns:a16="http://schemas.microsoft.com/office/drawing/2014/main" id="{6EB4A95A-BD17-4E96-8CCA-C1A059623120}"/>
-              </a:ext>
-            </a:extLst>
-          </p:cNvPr>
-          <p:cNvPicPr>
-            <a:picLocks noChangeAspect="1"/>
-          </p:cNvPicPr>
-          <p:nvPr/>
-        </p:nvPicPr>
-        <p:blipFill>
-          <a:blip r:embed="rId3">
-            <a:extLst>
-              <a:ext uri="{96DAC541-7B7A-43D3-8B79-37D633B846F1}">
-                <asvg:svgBlip xmlns:asvg="http://schemas.microsoft.com/office/drawing/2016/SVG/main" r:embed="rId4"/>
-              </a:ext>
-            </a:extLst>
-          </a:blip>
-          <a:stretch>
-            <a:fillRect/>
-          </a:stretch>
-        </p:blipFill>
-        <p:spPr>
-          <a:xfrm>
-            <a:off x="2486025" y="4352925"/>
-            <a:ext cx="914400" cy="914400"/>
-          </a:xfrm>
-          <a:prstGeom prst="rect">
-            <a:avLst/>
-          </a:prstGeom>
-        </p:spPr>
-      </p:pic>
-      <p:pic>
-        <p:nvPicPr>
-          <p:cNvPr id="10" name="Obrázek 9">
-            <a:extLst>
-              <a:ext uri="{FF2B5EF4-FFF2-40B4-BE49-F238E27FC236}">
-                <a16:creationId xmlns:a16="http://schemas.microsoft.com/office/drawing/2014/main" id="{C9067023-1D5F-4B67-BAD8-15D36773FB27}"/>
-              </a:ext>
-            </a:extLst>
-          </p:cNvPr>
-          <p:cNvPicPr>
-            <a:picLocks noChangeAspect="1"/>
-          </p:cNvPicPr>
-          <p:nvPr/>
-        </p:nvPicPr>
-        <p:blipFill>
-          <a:blip r:embed="rId5">
-            <a:extLst>
-              <a:ext uri="{837473B0-CC2E-450A-ABE3-18F120FF3D39}">
-                <a1611:picAttrSrcUrl xmlns:a1611="http://schemas.microsoft.com/office/drawing/2016/11/main" r:id="rId6"/>
-              </a:ext>
-            </a:extLst>
-          </a:blip>
-          <a:stretch>
-            <a:fillRect/>
-          </a:stretch>
-        </p:blipFill>
-        <p:spPr>
-          <a:xfrm>
-            <a:off x="4402100" y="3767824"/>
-            <a:ext cx="900150" cy="900150"/>
-          </a:xfrm>
-          <a:prstGeom prst="rect">
-            <a:avLst/>
-          </a:prstGeom>
-        </p:spPr>
-      </p:pic>
-    </p:spTree>
-    <p:extLst>
-      <p:ext uri="{BB962C8B-B14F-4D97-AF65-F5344CB8AC3E}">
-        <p14:creationId xmlns:p14="http://schemas.microsoft.com/office/powerpoint/2010/main" val="189779514"/>
-      </p:ext>
-    </p:extLst>
-  </p:cSld>
-  <p:clrMapOvr>
-    <a:masterClrMapping/>
-  </p:clrMapOvr>
-  <p:transition>
-    <p:fade/>
-  </p:transition>
-</p:sld>
-</file>
-
-<file path=ppt/slides/slide20.xml><?xml version="1.0" encoding="utf-8"?>
+<file path=ppt/slides/slide21.xml><?xml version="1.0" encoding="utf-8"?>
 <p:sld xmlns:a="http://schemas.openxmlformats.org/drawingml/2006/main" xmlns:r="http://schemas.openxmlformats.org/officeDocument/2006/relationships" xmlns:p="http://schemas.openxmlformats.org/presentationml/2006/main">
   <p:cSld>
     <p:spTree>
@@ -41695,7 +41994,7 @@
 </p:sld>
 </file>
 
-<file path=ppt/slides/slide21.xml><?xml version="1.0" encoding="utf-8"?>
+<file path=ppt/slides/slide22.xml><?xml version="1.0" encoding="utf-8"?>
 <p:sld xmlns:a="http://schemas.openxmlformats.org/drawingml/2006/main" xmlns:r="http://schemas.openxmlformats.org/officeDocument/2006/relationships" xmlns:p="http://schemas.openxmlformats.org/presentationml/2006/main">
   <p:cSld>
     <p:spTree>
@@ -41801,96 +42100,6 @@
     <p:extLst>
       <p:ext uri="{BB962C8B-B14F-4D97-AF65-F5344CB8AC3E}">
         <p14:creationId xmlns:p14="http://schemas.microsoft.com/office/powerpoint/2010/main" val="721120829"/>
-      </p:ext>
-    </p:extLst>
-  </p:cSld>
-  <p:clrMapOvr>
-    <a:masterClrMapping/>
-  </p:clrMapOvr>
-  <p:transition>
-    <p:fade/>
-  </p:transition>
-</p:sld>
-</file>
-
-<file path=ppt/slides/slide22.xml><?xml version="1.0" encoding="utf-8"?>
-<p:sld xmlns:a="http://schemas.openxmlformats.org/drawingml/2006/main" xmlns:r="http://schemas.openxmlformats.org/officeDocument/2006/relationships" xmlns:p="http://schemas.openxmlformats.org/presentationml/2006/main">
-  <p:cSld>
-    <p:spTree>
-      <p:nvGrpSpPr>
-        <p:cNvPr id="1" name=""/>
-        <p:cNvGrpSpPr/>
-        <p:nvPr/>
-      </p:nvGrpSpPr>
-      <p:grpSpPr>
-        <a:xfrm>
-          <a:off x="0" y="0"/>
-          <a:ext cx="0" cy="0"/>
-          <a:chOff x="0" y="0"/>
-          <a:chExt cx="0" cy="0"/>
-        </a:xfrm>
-      </p:grpSpPr>
-      <p:sp>
-        <p:nvSpPr>
-          <p:cNvPr id="2" name="Nadpis 1">
-            <a:extLst>
-              <a:ext uri="{FF2B5EF4-FFF2-40B4-BE49-F238E27FC236}">
-                <a16:creationId xmlns:a16="http://schemas.microsoft.com/office/drawing/2014/main" id="{E15E1E1D-C8BC-4587-98EB-53F20B61F918}"/>
-              </a:ext>
-            </a:extLst>
-          </p:cNvPr>
-          <p:cNvSpPr>
-            <a:spLocks noGrp="1"/>
-          </p:cNvSpPr>
-          <p:nvPr>
-            <p:ph type="title"/>
-          </p:nvPr>
-        </p:nvSpPr>
-        <p:spPr/>
-        <p:txBody>
-          <a:bodyPr/>
-          <a:lstStyle/>
-          <a:p>
-            <a:r>
-              <a:rPr lang="en-US" dirty="0"/>
-              <a:t>Azure Functions static binding</a:t>
-            </a:r>
-            <a:endParaRPr lang="cs-CZ" dirty="0"/>
-          </a:p>
-        </p:txBody>
-      </p:sp>
-      <p:graphicFrame>
-        <p:nvGraphicFramePr>
-          <p:cNvPr id="3" name="Diagram 2">
-            <a:extLst>
-              <a:ext uri="{FF2B5EF4-FFF2-40B4-BE49-F238E27FC236}">
-                <a16:creationId xmlns:a16="http://schemas.microsoft.com/office/drawing/2014/main" id="{E1FA9DF9-DAAA-4E8A-BE6A-BB282CF9A479}"/>
-              </a:ext>
-            </a:extLst>
-          </p:cNvPr>
-          <p:cNvGraphicFramePr/>
-          <p:nvPr>
-            <p:extLst>
-              <p:ext uri="{D42A27DB-BD31-4B8C-83A1-F6EECF244321}">
-                <p14:modId xmlns:p14="http://schemas.microsoft.com/office/powerpoint/2010/main" val="2004666896"/>
-              </p:ext>
-            </p:extLst>
-          </p:nvPr>
-        </p:nvGraphicFramePr>
-        <p:xfrm>
-          <a:off x="2032000" y="2362974"/>
-          <a:ext cx="8128000" cy="2132052"/>
-        </p:xfrm>
-        <a:graphic>
-          <a:graphicData uri="http://schemas.openxmlformats.org/drawingml/2006/diagram">
-            <dgm:relIds xmlns:dgm="http://schemas.openxmlformats.org/drawingml/2006/diagram" xmlns:r="http://schemas.openxmlformats.org/officeDocument/2006/relationships" r:dm="rId2" r:lo="rId3" r:qs="rId4" r:cs="rId5"/>
-          </a:graphicData>
-        </a:graphic>
-      </p:graphicFrame>
-    </p:spTree>
-    <p:extLst>
-      <p:ext uri="{BB962C8B-B14F-4D97-AF65-F5344CB8AC3E}">
-        <p14:creationId xmlns:p14="http://schemas.microsoft.com/office/powerpoint/2010/main" val="1254702003"/>
       </p:ext>
     </p:extLst>
   </p:cSld>
@@ -41943,6 +42152,96 @@
           <a:p>
             <a:r>
               <a:rPr lang="en-US" dirty="0"/>
+              <a:t>Azure Functions static binding</a:t>
+            </a:r>
+            <a:endParaRPr lang="cs-CZ" dirty="0"/>
+          </a:p>
+        </p:txBody>
+      </p:sp>
+      <p:graphicFrame>
+        <p:nvGraphicFramePr>
+          <p:cNvPr id="3" name="Diagram 2">
+            <a:extLst>
+              <a:ext uri="{FF2B5EF4-FFF2-40B4-BE49-F238E27FC236}">
+                <a16:creationId xmlns:a16="http://schemas.microsoft.com/office/drawing/2014/main" id="{E1FA9DF9-DAAA-4E8A-BE6A-BB282CF9A479}"/>
+              </a:ext>
+            </a:extLst>
+          </p:cNvPr>
+          <p:cNvGraphicFramePr/>
+          <p:nvPr>
+            <p:extLst>
+              <p:ext uri="{D42A27DB-BD31-4B8C-83A1-F6EECF244321}">
+                <p14:modId xmlns:p14="http://schemas.microsoft.com/office/powerpoint/2010/main" val="2004666896"/>
+              </p:ext>
+            </p:extLst>
+          </p:nvPr>
+        </p:nvGraphicFramePr>
+        <p:xfrm>
+          <a:off x="2032000" y="2362974"/>
+          <a:ext cx="8128000" cy="2132052"/>
+        </p:xfrm>
+        <a:graphic>
+          <a:graphicData uri="http://schemas.openxmlformats.org/drawingml/2006/diagram">
+            <dgm:relIds xmlns:dgm="http://schemas.openxmlformats.org/drawingml/2006/diagram" xmlns:r="http://schemas.openxmlformats.org/officeDocument/2006/relationships" r:dm="rId2" r:lo="rId3" r:qs="rId4" r:cs="rId5"/>
+          </a:graphicData>
+        </a:graphic>
+      </p:graphicFrame>
+    </p:spTree>
+    <p:extLst>
+      <p:ext uri="{BB962C8B-B14F-4D97-AF65-F5344CB8AC3E}">
+        <p14:creationId xmlns:p14="http://schemas.microsoft.com/office/powerpoint/2010/main" val="1254702003"/>
+      </p:ext>
+    </p:extLst>
+  </p:cSld>
+  <p:clrMapOvr>
+    <a:masterClrMapping/>
+  </p:clrMapOvr>
+  <p:transition>
+    <p:fade/>
+  </p:transition>
+</p:sld>
+</file>
+
+<file path=ppt/slides/slide24.xml><?xml version="1.0" encoding="utf-8"?>
+<p:sld xmlns:a="http://schemas.openxmlformats.org/drawingml/2006/main" xmlns:r="http://schemas.openxmlformats.org/officeDocument/2006/relationships" xmlns:p="http://schemas.openxmlformats.org/presentationml/2006/main">
+  <p:cSld>
+    <p:spTree>
+      <p:nvGrpSpPr>
+        <p:cNvPr id="1" name=""/>
+        <p:cNvGrpSpPr/>
+        <p:nvPr/>
+      </p:nvGrpSpPr>
+      <p:grpSpPr>
+        <a:xfrm>
+          <a:off x="0" y="0"/>
+          <a:ext cx="0" cy="0"/>
+          <a:chOff x="0" y="0"/>
+          <a:chExt cx="0" cy="0"/>
+        </a:xfrm>
+      </p:grpSpPr>
+      <p:sp>
+        <p:nvSpPr>
+          <p:cNvPr id="2" name="Nadpis 1">
+            <a:extLst>
+              <a:ext uri="{FF2B5EF4-FFF2-40B4-BE49-F238E27FC236}">
+                <a16:creationId xmlns:a16="http://schemas.microsoft.com/office/drawing/2014/main" id="{E15E1E1D-C8BC-4587-98EB-53F20B61F918}"/>
+              </a:ext>
+            </a:extLst>
+          </p:cNvPr>
+          <p:cNvSpPr>
+            <a:spLocks noGrp="1"/>
+          </p:cNvSpPr>
+          <p:nvPr>
+            <p:ph type="title"/>
+          </p:nvPr>
+        </p:nvSpPr>
+        <p:spPr/>
+        <p:txBody>
+          <a:bodyPr/>
+          <a:lstStyle/>
+          <a:p>
+            <a:r>
+              <a:rPr lang="en-US" dirty="0"/>
               <a:t>Azure Functions dynamic binding</a:t>
             </a:r>
             <a:endParaRPr lang="cs-CZ" dirty="0"/>
@@ -41993,7 +42292,7 @@
 </p:sld>
 </file>
 
-<file path=ppt/slides/slide24.xml><?xml version="1.0" encoding="utf-8"?>
+<file path=ppt/slides/slide25.xml><?xml version="1.0" encoding="utf-8"?>
 <p:sld xmlns:a="http://schemas.openxmlformats.org/drawingml/2006/main" xmlns:r="http://schemas.openxmlformats.org/officeDocument/2006/relationships" xmlns:p="http://schemas.openxmlformats.org/presentationml/2006/main">
   <p:cSld>
     <p:spTree>
@@ -42656,7 +42955,7 @@
 </p:sld>
 </file>
 
-<file path=ppt/slides/slide25.xml><?xml version="1.0" encoding="utf-8"?>
+<file path=ppt/slides/slide26.xml><?xml version="1.0" encoding="utf-8"?>
 <p:sld xmlns:a="http://schemas.openxmlformats.org/drawingml/2006/main" xmlns:r="http://schemas.openxmlformats.org/officeDocument/2006/relationships" xmlns:p="http://schemas.openxmlformats.org/presentationml/2006/main">
   <p:cSld>
     <p:spTree>
@@ -42720,7 +43019,7 @@
 </p:sld>
 </file>
 
-<file path=ppt/slides/slide26.xml><?xml version="1.0" encoding="utf-8"?>
+<file path=ppt/slides/slide27.xml><?xml version="1.0" encoding="utf-8"?>
 <p:sld xmlns:a="http://schemas.openxmlformats.org/drawingml/2006/main" xmlns:r="http://schemas.openxmlformats.org/officeDocument/2006/relationships" xmlns:p="http://schemas.openxmlformats.org/presentationml/2006/main">
   <p:cSld>
     <p:spTree>
@@ -42947,7 +43246,7 @@
 </p:sld>
 </file>
 
-<file path=ppt/slides/slide27.xml><?xml version="1.0" encoding="utf-8"?>
+<file path=ppt/slides/slide28.xml><?xml version="1.0" encoding="utf-8"?>
 <p:sld xmlns:a="http://schemas.openxmlformats.org/drawingml/2006/main" xmlns:r="http://schemas.openxmlformats.org/officeDocument/2006/relationships" xmlns:p="http://schemas.openxmlformats.org/presentationml/2006/main">
   <p:cSld>
     <p:spTree>
@@ -44928,7 +45227,7 @@
           <p:nvPr>
             <p:extLst>
               <p:ext uri="{D42A27DB-BD31-4B8C-83A1-F6EECF244321}">
-                <p14:modId xmlns:p14="http://schemas.microsoft.com/office/powerpoint/2010/main" val="3052982294"/>
+                <p14:modId xmlns:p14="http://schemas.microsoft.com/office/powerpoint/2010/main" val="3805488741"/>
               </p:ext>
             </p:extLst>
           </p:nvPr>

</xml_diff>

<commit_message>
Comment empty stream meaning.
</commit_message>
<xml_diff>
--- a/slides/Presentation.pptx
+++ b/slides/Presentation.pptx
@@ -6704,7 +6704,7 @@
   <dgm:whole/>
   <dgm:extLst>
     <a:ext uri="http://schemas.microsoft.com/office/drawing/2008/diagram">
-      <dsp:dataModelExt xmlns:dsp="http://schemas.microsoft.com/office/drawing/2008/diagram" relId="rId6" minVer="http://schemas.openxmlformats.org/drawingml/2006/diagram"/>
+      <dsp:dataModelExt xmlns:dsp="http://schemas.microsoft.com/office/drawing/2008/diagram" relId="rId7" minVer="http://schemas.openxmlformats.org/drawingml/2006/diagram"/>
     </a:ext>
   </dgm:extLst>
 </dgm:dataModel>
@@ -7046,11 +7046,7 @@
         <a:p>
           <a:r>
             <a:rPr lang="en-US" dirty="0"/>
-            <a:t>Write </a:t>
-          </a:r>
-          <a:r>
-            <a:rPr lang="en-US"/>
-            <a:t>to table</a:t>
+            <a:t>HTTP response</a:t>
           </a:r>
           <a:endParaRPr lang="cs-CZ" dirty="0"/>
         </a:p>
@@ -9998,11 +9994,7 @@
           </a:pPr>
           <a:r>
             <a:rPr lang="en-US" sz="1700" kern="1200" dirty="0"/>
-            <a:t>Write </a:t>
-          </a:r>
-          <a:r>
-            <a:rPr lang="en-US" sz="1700" kern="1200"/>
-            <a:t>to table</a:t>
+            <a:t>HTTP response</a:t>
           </a:r>
           <a:endParaRPr lang="cs-CZ" sz="1700" kern="1200" dirty="0"/>
         </a:p>
@@ -19659,7 +19651,7 @@
               <a:rPr lang="en-US" smtClean="0">
                 <a:latin typeface="Segoe UI" pitchFamily="34" charset="0"/>
               </a:rPr>
-              <a:t>12/2/2020 8:36 AM</a:t>
+              <a:t>12/2/2020 6:24 PM</a:t>
             </a:fld>
             <a:endParaRPr lang="en-US" dirty="0">
               <a:latin typeface="Segoe UI" pitchFamily="34" charset="0"/>
@@ -19937,7 +19929,7 @@
           <a:p>
             <a:fld id="{386CE63F-9E7F-4C04-9D0D-FCA25A8E9E86}" type="datetime8">
               <a:rPr lang="en-US" smtClean="0"/>
-              <a:t>12/2/2020 8:33 AM</a:t>
+              <a:t>12/2/2020 6:20 PM</a:t>
             </a:fld>
             <a:endParaRPr lang="en-US" dirty="0"/>
           </a:p>
@@ -20304,7 +20296,7 @@
           <a:p>
             <a:fld id="{62072DC8-D49D-432C-9D46-A7718B5F5490}" type="datetime8">
               <a:rPr lang="en-US" smtClean="0"/>
-              <a:t>12/2/2020 8:33 AM</a:t>
+              <a:t>12/2/2020 6:20 PM</a:t>
             </a:fld>
             <a:endParaRPr lang="en-US" dirty="0"/>
           </a:p>
@@ -20469,7 +20461,7 @@
           <a:p>
             <a:fld id="{B16574EE-8191-4BCC-ABE6-D00A4F4D7690}" type="datetime8">
               <a:rPr lang="en-US" smtClean="0"/>
-              <a:t>12/2/2020 8:33 AM</a:t>
+              <a:t>12/2/2020 6:20 PM</a:t>
             </a:fld>
             <a:endParaRPr lang="en-US" dirty="0"/>
           </a:p>
@@ -20558,28 +20550,11 @@
           <a:p>
             <a:r>
               <a:rPr lang="en-US" dirty="0"/>
-              <a:t>2 </a:t>
+              <a:t>Service Bus se </a:t>
             </a:r>
             <a:r>
               <a:rPr lang="en-US" dirty="0" err="1"/>
-              <a:t>Animace</a:t>
-            </a:r>
-            <a:br>
-              <a:rPr lang="en-US" dirty="0"/>
-            </a:br>
-            <a:r>
-              <a:rPr lang="en-US" dirty="0"/>
-              <a:t>1 problém service bus</a:t>
-            </a:r>
-          </a:p>
-          <a:p>
-            <a:r>
-              <a:rPr lang="en-US" dirty="0"/>
-              <a:t>2 druhý problém, funkce </a:t>
-            </a:r>
-            <a:r>
-              <a:rPr lang="en-US" dirty="0" err="1"/>
-              <a:t>nic</a:t>
+              <a:t>obzížně</a:t>
             </a:r>
             <a:r>
               <a:rPr lang="en-US" dirty="0"/>
@@ -20587,7 +20562,27 @@
             </a:r>
             <a:r>
               <a:rPr lang="en-US" dirty="0" err="1"/>
-              <a:t>nevrací</a:t>
+              <a:t>testuje</a:t>
+            </a:r>
+            <a:r>
+              <a:rPr lang="en-US" dirty="0"/>
+              <a:t> </a:t>
+            </a:r>
+            <a:r>
+              <a:rPr lang="en-US" dirty="0" err="1"/>
+              <a:t>lokálně</a:t>
+            </a:r>
+            <a:r>
+              <a:rPr lang="en-US" dirty="0"/>
+              <a:t>. Na </a:t>
+            </a:r>
+            <a:r>
+              <a:rPr lang="en-US" dirty="0" err="1"/>
+              <a:t>ostatní</a:t>
+            </a:r>
+            <a:r>
+              <a:rPr lang="en-US" dirty="0"/>
+              <a:t> věci máme storage emulator.</a:t>
             </a:r>
             <a:endParaRPr lang="cs-CZ" dirty="0"/>
           </a:p>
@@ -20683,7 +20678,7 @@
           <a:p>
             <a:fld id="{386CE63F-9E7F-4C04-9D0D-FCA25A8E9E86}" type="datetime8">
               <a:rPr lang="en-US" smtClean="0"/>
-              <a:t>12/2/2020 8:33 AM</a:t>
+              <a:t>12/2/2020 6:24 PM</a:t>
             </a:fld>
             <a:endParaRPr lang="en-US" dirty="0"/>
           </a:p>
@@ -20707,7 +20702,7 @@
             <a:fld id="{B4008EB6-D09E-4580-8CD6-DDB14511944F}" type="slidenum">
               <a:rPr lang="en-US" smtClean="0"/>
               <a:pPr/>
-              <a:t>19</a:t>
+              <a:t>18</a:t>
             </a:fld>
             <a:endParaRPr lang="en-US" dirty="0"/>
           </a:p>
@@ -20716,7 +20711,7 @@
     </p:spTree>
     <p:extLst>
       <p:ext uri="{BB962C8B-B14F-4D97-AF65-F5344CB8AC3E}">
-        <p14:creationId xmlns:p14="http://schemas.microsoft.com/office/powerpoint/2010/main" val="3989907929"/>
+        <p14:creationId xmlns:p14="http://schemas.microsoft.com/office/powerpoint/2010/main" val="2900376067"/>
       </p:ext>
     </p:extLst>
   </p:cSld>
@@ -20897,7 +20892,221 @@
           <a:p>
             <a:fld id="{386CE63F-9E7F-4C04-9D0D-FCA25A8E9E86}" type="datetime8">
               <a:rPr lang="en-US" smtClean="0"/>
-              <a:t>12/2/2020 8:33 AM</a:t>
+              <a:t>12/2/2020 6:20 PM</a:t>
+            </a:fld>
+            <a:endParaRPr lang="en-US" dirty="0"/>
+          </a:p>
+        </p:txBody>
+      </p:sp>
+      <p:sp>
+        <p:nvSpPr>
+          <p:cNvPr id="7" name="Zástupný symbol pro číslo snímku 6"/>
+          <p:cNvSpPr>
+            <a:spLocks noGrp="1"/>
+          </p:cNvSpPr>
+          <p:nvPr>
+            <p:ph type="sldNum" sz="quarter" idx="5"/>
+          </p:nvPr>
+        </p:nvSpPr>
+        <p:spPr/>
+        <p:txBody>
+          <a:bodyPr/>
+          <a:lstStyle/>
+          <a:p>
+            <a:fld id="{B4008EB6-D09E-4580-8CD6-DDB14511944F}" type="slidenum">
+              <a:rPr lang="en-US" smtClean="0"/>
+              <a:pPr/>
+              <a:t>19</a:t>
+            </a:fld>
+            <a:endParaRPr lang="en-US" dirty="0"/>
+          </a:p>
+        </p:txBody>
+      </p:sp>
+    </p:spTree>
+    <p:extLst>
+      <p:ext uri="{BB962C8B-B14F-4D97-AF65-F5344CB8AC3E}">
+        <p14:creationId xmlns:p14="http://schemas.microsoft.com/office/powerpoint/2010/main" val="3989907929"/>
+      </p:ext>
+    </p:extLst>
+  </p:cSld>
+  <p:clrMapOvr>
+    <a:masterClrMapping/>
+  </p:clrMapOvr>
+</p:notes>
+</file>
+
+<file path=ppt/notesSlides/notesSlide13.xml><?xml version="1.0" encoding="utf-8"?>
+<p:notes xmlns:a="http://schemas.openxmlformats.org/drawingml/2006/main" xmlns:r="http://schemas.openxmlformats.org/officeDocument/2006/relationships" xmlns:p="http://schemas.openxmlformats.org/presentationml/2006/main">
+  <p:cSld>
+    <p:spTree>
+      <p:nvGrpSpPr>
+        <p:cNvPr id="1" name=""/>
+        <p:cNvGrpSpPr/>
+        <p:nvPr/>
+      </p:nvGrpSpPr>
+      <p:grpSpPr>
+        <a:xfrm>
+          <a:off x="0" y="0"/>
+          <a:ext cx="0" cy="0"/>
+          <a:chOff x="0" y="0"/>
+          <a:chExt cx="0" cy="0"/>
+        </a:xfrm>
+      </p:grpSpPr>
+      <p:sp>
+        <p:nvSpPr>
+          <p:cNvPr id="2" name="Zástupný symbol pro obrázek snímku 1"/>
+          <p:cNvSpPr>
+            <a:spLocks noGrp="1" noRot="1" noChangeAspect="1"/>
+          </p:cNvSpPr>
+          <p:nvPr>
+            <p:ph type="sldImg"/>
+          </p:nvPr>
+        </p:nvSpPr>
+        <p:spPr/>
+      </p:sp>
+      <p:sp>
+        <p:nvSpPr>
+          <p:cNvPr id="3" name="Zástupný symbol pro poznámky 2"/>
+          <p:cNvSpPr>
+            <a:spLocks noGrp="1"/>
+          </p:cNvSpPr>
+          <p:nvPr>
+            <p:ph type="body" idx="1"/>
+          </p:nvPr>
+        </p:nvSpPr>
+        <p:spPr/>
+        <p:txBody>
+          <a:bodyPr/>
+          <a:lstStyle/>
+          <a:p>
+            <a:r>
+              <a:rPr lang="en-US" dirty="0"/>
+              <a:t>2 </a:t>
+            </a:r>
+            <a:r>
+              <a:rPr lang="en-US" dirty="0" err="1"/>
+              <a:t>Animace</a:t>
+            </a:r>
+            <a:br>
+              <a:rPr lang="en-US" dirty="0"/>
+            </a:br>
+            <a:r>
+              <a:rPr lang="en-US" dirty="0"/>
+              <a:t>1 problém service bus</a:t>
+            </a:r>
+          </a:p>
+          <a:p>
+            <a:r>
+              <a:rPr lang="en-US" dirty="0"/>
+              <a:t>2 druhý problém, funkce </a:t>
+            </a:r>
+            <a:r>
+              <a:rPr lang="en-US" dirty="0" err="1"/>
+              <a:t>nic</a:t>
+            </a:r>
+            <a:r>
+              <a:rPr lang="en-US" dirty="0"/>
+              <a:t> </a:t>
+            </a:r>
+            <a:r>
+              <a:rPr lang="en-US" dirty="0" err="1"/>
+              <a:t>nevrací</a:t>
+            </a:r>
+            <a:endParaRPr lang="cs-CZ" dirty="0"/>
+          </a:p>
+        </p:txBody>
+      </p:sp>
+      <p:sp>
+        <p:nvSpPr>
+          <p:cNvPr id="4" name="Zástupný symbol pro záhlaví 3"/>
+          <p:cNvSpPr>
+            <a:spLocks noGrp="1"/>
+          </p:cNvSpPr>
+          <p:nvPr>
+            <p:ph type="hdr" sz="quarter"/>
+          </p:nvPr>
+        </p:nvSpPr>
+        <p:spPr/>
+        <p:txBody>
+          <a:bodyPr/>
+          <a:lstStyle/>
+          <a:p>
+            <a:endParaRPr lang="en-US" dirty="0"/>
+          </a:p>
+        </p:txBody>
+      </p:sp>
+      <p:sp>
+        <p:nvSpPr>
+          <p:cNvPr id="5" name="Zástupný symbol pro zápatí 4"/>
+          <p:cNvSpPr>
+            <a:spLocks noGrp="1"/>
+          </p:cNvSpPr>
+          <p:nvPr>
+            <p:ph type="ftr" sz="quarter" idx="4"/>
+          </p:nvPr>
+        </p:nvSpPr>
+        <p:spPr/>
+        <p:txBody>
+          <a:bodyPr/>
+          <a:lstStyle/>
+          <a:p>
+            <a:pPr defTabSz="914099" eaLnBrk="0" hangingPunct="0"/>
+            <a:r>
+              <a:rPr lang="en-US" sz="400">
+                <a:gradFill>
+                  <a:gsLst>
+                    <a:gs pos="0">
+                      <a:prstClr val="black"/>
+                    </a:gs>
+                    <a:gs pos="100000">
+                      <a:prstClr val="black"/>
+                    </a:gs>
+                  </a:gsLst>
+                  <a:lin ang="5400000" scaled="0"/>
+                </a:gradFill>
+                <a:latin typeface="Segoe UI" pitchFamily="34" charset="0"/>
+                <a:ea typeface="Segoe UI" pitchFamily="34" charset="0"/>
+                <a:cs typeface="Segoe UI" pitchFamily="34" charset="0"/>
+              </a:rPr>
+              <a:t>© Microsoft Corporation. All rights reserved. MICROSOFT MAKES NO WARRANTIES, EXPRESS, IMPLIED OR STATUTORY, AS TO THE INFORMATION IN THIS PRESENTATION.</a:t>
+            </a:r>
+            <a:endParaRPr lang="en-US" sz="400" dirty="0">
+              <a:gradFill>
+                <a:gsLst>
+                  <a:gs pos="0">
+                    <a:prstClr val="black"/>
+                  </a:gs>
+                  <a:gs pos="100000">
+                    <a:prstClr val="black"/>
+                  </a:gs>
+                </a:gsLst>
+                <a:lin ang="5400000" scaled="0"/>
+              </a:gradFill>
+              <a:latin typeface="Segoe UI" pitchFamily="34" charset="0"/>
+              <a:ea typeface="Segoe UI" pitchFamily="34" charset="0"/>
+              <a:cs typeface="Segoe UI" pitchFamily="34" charset="0"/>
+            </a:endParaRPr>
+          </a:p>
+        </p:txBody>
+      </p:sp>
+      <p:sp>
+        <p:nvSpPr>
+          <p:cNvPr id="6" name="Zástupný symbol pro datum 5"/>
+          <p:cNvSpPr>
+            <a:spLocks noGrp="1"/>
+          </p:cNvSpPr>
+          <p:nvPr>
+            <p:ph type="dt" idx="1"/>
+          </p:nvPr>
+        </p:nvSpPr>
+        <p:spPr/>
+        <p:txBody>
+          <a:bodyPr/>
+          <a:lstStyle/>
+          <a:p>
+            <a:fld id="{386CE63F-9E7F-4C04-9D0D-FCA25A8E9E86}" type="datetime8">
+              <a:rPr lang="en-US" smtClean="0"/>
+              <a:t>12/2/2020 6:20 PM</a:t>
             </a:fld>
             <a:endParaRPr lang="en-US" dirty="0"/>
           </a:p>
@@ -20940,7 +21149,7 @@
 </p:notes>
 </file>
 
-<file path=ppt/notesSlides/notesSlide13.xml><?xml version="1.0" encoding="utf-8"?>
+<file path=ppt/notesSlides/notesSlide14.xml><?xml version="1.0" encoding="utf-8"?>
 <p:notes xmlns:a="http://schemas.openxmlformats.org/drawingml/2006/main" xmlns:r="http://schemas.openxmlformats.org/officeDocument/2006/relationships" xmlns:p="http://schemas.openxmlformats.org/presentationml/2006/main">
   <p:cSld>
     <p:spTree>
@@ -21062,7 +21271,7 @@
           <a:p>
             <a:fld id="{B16574EE-8191-4BCC-ABE6-D00A4F4D7690}" type="datetime8">
               <a:rPr lang="en-US" smtClean="0"/>
-              <a:t>12/2/2020 8:33 AM</a:t>
+              <a:t>12/2/2020 6:20 PM</a:t>
             </a:fld>
             <a:endParaRPr lang="en-US" dirty="0"/>
           </a:p>
@@ -21267,7 +21476,7 @@
           <a:p>
             <a:fld id="{386CE63F-9E7F-4C04-9D0D-FCA25A8E9E86}" type="datetime8">
               <a:rPr lang="en-US" smtClean="0"/>
-              <a:t>12/2/2020 8:33 AM</a:t>
+              <a:t>12/2/2020 6:20 PM</a:t>
             </a:fld>
             <a:endParaRPr lang="en-US" dirty="0"/>
           </a:p>
@@ -21572,7 +21781,7 @@
           <a:p>
             <a:fld id="{386CE63F-9E7F-4C04-9D0D-FCA25A8E9E86}" type="datetime8">
               <a:rPr lang="en-US" smtClean="0"/>
-              <a:t>12/2/2020 8:33 AM</a:t>
+              <a:t>12/2/2020 6:20 PM</a:t>
             </a:fld>
             <a:endParaRPr lang="en-US" dirty="0"/>
           </a:p>
@@ -21780,7 +21989,7 @@
           <a:p>
             <a:fld id="{386CE63F-9E7F-4C04-9D0D-FCA25A8E9E86}" type="datetime8">
               <a:rPr lang="en-US" smtClean="0"/>
-              <a:t>12/2/2020 8:38 AM</a:t>
+              <a:t>12/2/2020 6:20 PM</a:t>
             </a:fld>
             <a:endParaRPr lang="en-US" dirty="0"/>
           </a:p>
@@ -22001,7 +22210,7 @@
           <a:p>
             <a:fld id="{386CE63F-9E7F-4C04-9D0D-FCA25A8E9E86}" type="datetime8">
               <a:rPr lang="en-US" smtClean="0"/>
-              <a:t>12/2/2020 8:33 AM</a:t>
+              <a:t>12/2/2020 6:20 PM</a:t>
             </a:fld>
             <a:endParaRPr lang="en-US" dirty="0"/>
           </a:p>
@@ -22157,7 +22366,7 @@
           <a:p>
             <a:fld id="{D44C3489-8257-4E60-994D-6A5CEE67ED71}" type="datetime8">
               <a:rPr lang="en-US" smtClean="0"/>
-              <a:t>12/2/2020 8:33 AM</a:t>
+              <a:t>12/2/2020 6:20 PM</a:t>
             </a:fld>
             <a:endParaRPr lang="en-US" dirty="0"/>
           </a:p>
@@ -22322,7 +22531,7 @@
           <a:p>
             <a:fld id="{D44C3489-8257-4E60-994D-6A5CEE67ED71}" type="datetime8">
               <a:rPr lang="en-US" smtClean="0"/>
-              <a:t>12/2/2020 4:48 PM</a:t>
+              <a:t>12/2/2020 6:20 PM</a:t>
             </a:fld>
             <a:endParaRPr lang="en-US" dirty="0"/>
           </a:p>
@@ -22495,7 +22704,7 @@
           <a:p>
             <a:fld id="{D44C3489-8257-4E60-994D-6A5CEE67ED71}" type="datetime8">
               <a:rPr lang="en-US" smtClean="0"/>
-              <a:t>12/2/2020 9:07 AM</a:t>
+              <a:t>12/2/2020 6:20 PM</a:t>
             </a:fld>
             <a:endParaRPr lang="en-US" dirty="0"/>
           </a:p>
@@ -22741,7 +22950,7 @@
           <a:p>
             <a:fld id="{386CE63F-9E7F-4C04-9D0D-FCA25A8E9E86}" type="datetime8">
               <a:rPr lang="en-US" smtClean="0"/>
-              <a:t>12/2/2020 5:17 PM</a:t>
+              <a:t>12/2/2020 6:20 PM</a:t>
             </a:fld>
             <a:endParaRPr lang="en-US" dirty="0"/>
           </a:p>
@@ -40796,7 +41005,7 @@
         </p:xfrm>
         <a:graphic>
           <a:graphicData uri="http://schemas.openxmlformats.org/drawingml/2006/diagram">
-            <dgm:relIds xmlns:dgm="http://schemas.openxmlformats.org/drawingml/2006/diagram" xmlns:r="http://schemas.openxmlformats.org/officeDocument/2006/relationships" r:dm="rId2" r:lo="rId3" r:qs="rId4" r:cs="rId5"/>
+            <dgm:relIds xmlns:dgm="http://schemas.openxmlformats.org/drawingml/2006/diagram" xmlns:r="http://schemas.openxmlformats.org/officeDocument/2006/relationships" r:dm="rId3" r:lo="rId4" r:qs="rId5" r:cs="rId6"/>
           </a:graphicData>
         </a:graphic>
       </p:graphicFrame>
@@ -42261,7 +42470,7 @@
           <p:nvPr>
             <p:extLst>
               <p:ext uri="{D42A27DB-BD31-4B8C-83A1-F6EECF244321}">
-                <p14:modId xmlns:p14="http://schemas.microsoft.com/office/powerpoint/2010/main" val="2269149378"/>
+                <p14:modId xmlns:p14="http://schemas.microsoft.com/office/powerpoint/2010/main" val="2678195093"/>
               </p:ext>
             </p:extLst>
           </p:nvPr>
@@ -46420,15 +46629,6 @@
 </file>
 
 <file path=customXml/item1.xml><?xml version="1.0" encoding="utf-8"?>
-<?mso-contentType ?>
-<FormTemplates xmlns="http://schemas.microsoft.com/sharepoint/v3/contenttype/forms">
-  <Display>DocumentLibraryForm</Display>
-  <Edit>DocumentLibraryForm</Edit>
-  <New>DocumentLibraryForm</New>
-</FormTemplates>
-</file>
-
-<file path=customXml/item2.xml><?xml version="1.0" encoding="utf-8"?>
 <ct:contentTypeSchema xmlns:ct="http://schemas.microsoft.com/office/2006/metadata/contentType" xmlns:ma="http://schemas.microsoft.com/office/2006/metadata/properties/metaAttributes" ct:_="" ma:_="" ma:contentTypeName="Document" ma:contentTypeID="0x010100F6B78FCE4F94D941B32D6B6061C29C09" ma:contentTypeVersion="6" ma:contentTypeDescription="Create a new document." ma:contentTypeScope="" ma:versionID="e60c1c03b30260006a1d1ff9f7138066">
   <xsd:schema xmlns:xsd="http://www.w3.org/2001/XMLSchema" xmlns:xs="http://www.w3.org/2001/XMLSchema" xmlns:p="http://schemas.microsoft.com/office/2006/metadata/properties" xmlns:ns2="976fdccd-ca8b-4477-a16f-3129ac8e5ee5" xmlns:ns3="6d3b3f7c-4b71-40c9-8fff-4f7fb96ddea0" targetNamespace="http://schemas.microsoft.com/office/2006/metadata/properties" ma:root="true" ma:fieldsID="36db65670a08b7ac857e594ec6bc08a7" ns2:_="" ns3:_="">
     <xsd:import namespace="976fdccd-ca8b-4477-a16f-3129ac8e5ee5"/>
@@ -46607,6 +46807,15 @@
 </ct:contentTypeSchema>
 </file>
 
+<file path=customXml/item2.xml><?xml version="1.0" encoding="utf-8"?>
+<?mso-contentType ?>
+<FormTemplates xmlns="http://schemas.microsoft.com/sharepoint/v3/contenttype/forms">
+  <Display>DocumentLibraryForm</Display>
+  <Edit>DocumentLibraryForm</Edit>
+  <New>DocumentLibraryForm</New>
+</FormTemplates>
+</file>
+
 <file path=customXml/item3.xml><?xml version="1.0" encoding="utf-8"?>
 <p:properties xmlns:p="http://schemas.microsoft.com/office/2006/metadata/properties" xmlns:xsi="http://www.w3.org/2001/XMLSchema-instance" xmlns:pc="http://schemas.microsoft.com/office/infopath/2007/PartnerControls">
   <documentManagement>
@@ -46616,14 +46825,6 @@
 </file>
 
 <file path=customXml/itemProps1.xml><?xml version="1.0" encoding="utf-8"?>
-<ds:datastoreItem xmlns:ds="http://schemas.openxmlformats.org/officeDocument/2006/customXml" ds:itemID="{758FDAC0-319D-4A54-8D8E-1D42CB1F8004}">
-  <ds:schemaRefs>
-    <ds:schemaRef ds:uri="http://schemas.microsoft.com/sharepoint/v3/contenttype/forms"/>
-  </ds:schemaRefs>
-</ds:datastoreItem>
-</file>
-
-<file path=customXml/itemProps2.xml><?xml version="1.0" encoding="utf-8"?>
 <ds:datastoreItem xmlns:ds="http://schemas.openxmlformats.org/officeDocument/2006/customXml" ds:itemID="{22B300F8-02BB-451A-A12F-025F0CFD5908}">
   <ds:schemaRefs>
     <ds:schemaRef ds:uri="http://schemas.microsoft.com/office/2006/metadata/contentType"/>
@@ -46638,6 +46839,14 @@
     <ds:schemaRef ds:uri="http://purl.org/dc/elements/1.1/"/>
     <ds:schemaRef ds:uri="http://purl.org/dc/terms/"/>
     <ds:schemaRef ds:uri="http://schemas.microsoft.com/internal/obd"/>
+  </ds:schemaRefs>
+</ds:datastoreItem>
+</file>
+
+<file path=customXml/itemProps2.xml><?xml version="1.0" encoding="utf-8"?>
+<ds:datastoreItem xmlns:ds="http://schemas.openxmlformats.org/officeDocument/2006/customXml" ds:itemID="{758FDAC0-319D-4A54-8D8E-1D42CB1F8004}">
+  <ds:schemaRefs>
+    <ds:schemaRef ds:uri="http://schemas.microsoft.com/sharepoint/v3/contenttype/forms"/>
   </ds:schemaRefs>
 </ds:datastoreItem>
 </file>

</xml_diff>